<commit_message>
Updates to intern presentation
</commit_message>
<xml_diff>
--- a/docs/presentations/Intern_Showcase_Wei.pptx
+++ b/docs/presentations/Intern_Showcase_Wei.pptx
@@ -10687,7 +10687,7 @@
           <p:nvPr>
             <p:extLst>
               <p:ext uri="{D42A27DB-BD31-4B8C-83A1-F6EECF244321}">
-                <p14:modId xmlns:p14="http://schemas.microsoft.com/office/powerpoint/2010/main" val="2214367725"/>
+                <p14:modId xmlns:p14="http://schemas.microsoft.com/office/powerpoint/2010/main" val="3832467205"/>
               </p:ext>
             </p:extLst>
           </p:nvPr>
@@ -11486,16 +11486,6 @@
                         </a:rPr>
                         <a:t> Moments</a:t>
                       </a:r>
-                      <a:endParaRPr lang="en-US" sz="1400" b="1" dirty="0">
-                        <a:solidFill>
-                          <a:schemeClr val="tx1"/>
-                        </a:solidFill>
-                      </a:endParaRPr>
-                    </a:p>
-                    <a:p>
-                      <a:pPr marL="0" indent="0">
-                        <a:buNone/>
-                      </a:pPr>
                       <a:endParaRPr lang="en-US" sz="1400" dirty="0"/>
                     </a:p>
                     <a:p>
@@ -12510,21 +12500,6 @@
             <a:pPr marL="434333" lvl="2" indent="-171450"/>
             <a:r>
               <a:rPr lang="en-US" sz="1500" dirty="0"/>
-              <a:t>WSL, </a:t>
-            </a:r>
-            <a:r>
-              <a:rPr lang="en-US" sz="1500" dirty="0" err="1"/>
-              <a:t>Pyenv</a:t>
-            </a:r>
-            <a:r>
-              <a:rPr lang="en-US" sz="1500" dirty="0"/>
-              <a:t>, tox</a:t>
-            </a:r>
-          </a:p>
-          <a:p>
-            <a:pPr marL="434333" lvl="2" indent="-171450"/>
-            <a:r>
-              <a:rPr lang="en-US" sz="1500" dirty="0"/>
               <a:t>MongoDB and Mongo Express </a:t>
             </a:r>
           </a:p>
@@ -13739,6 +13714,25 @@
             <a:r>
               <a:rPr lang="en-US" sz="1600" dirty="0"/>
               <a:t>Basic principles on how to write robust code. </a:t>
+            </a:r>
+          </a:p>
+          <a:p>
+            <a:pPr marL="548633" lvl="2" indent="-285750"/>
+            <a:r>
+              <a:rPr lang="en-US" sz="1500" dirty="0" err="1"/>
+              <a:t>Pytest</a:t>
+            </a:r>
+            <a:r>
+              <a:rPr lang="en-US" sz="1500" dirty="0"/>
+              <a:t>, </a:t>
+            </a:r>
+            <a:r>
+              <a:rPr lang="en-US" sz="1500" dirty="0" err="1"/>
+              <a:t>Pydantic</a:t>
+            </a:r>
+            <a:r>
+              <a:rPr lang="en-US" sz="1500" dirty="0"/>
+              <a:t>, and tox</a:t>
             </a:r>
           </a:p>
           <a:p>
@@ -14706,7 +14700,7 @@
         <p:spPr>
           <a:xfrm>
             <a:off x="197260" y="4126878"/>
-            <a:ext cx="5289910" cy="864852"/>
+            <a:ext cx="4025141" cy="864852"/>
           </a:xfrm>
           <a:prstGeom prst="rect">
             <a:avLst/>
@@ -14728,7 +14722,7 @@
             <a:pPr marL="372902" lvl="1" indent="-285750"/>
             <a:r>
               <a:rPr lang="en-US" sz="1600" dirty="0"/>
-              <a:t>Mathew Cosgrove, Richard Card, and my fellow interns</a:t>
+              <a:t>Mathew Cosgrove, and my fellow interns</a:t>
             </a:r>
           </a:p>
           <a:p>
@@ -15604,15 +15598,6 @@
 </file>
 
 <file path=customXml/item1.xml><?xml version="1.0" encoding="utf-8"?>
-<?mso-contentType ?>
-<FormTemplates xmlns="http://schemas.microsoft.com/sharepoint/v3/contenttype/forms">
-  <Display>DocumentLibraryForm</Display>
-  <Edit>DocumentLibraryForm</Edit>
-  <New>DocumentLibraryForm</New>
-</FormTemplates>
-</file>
-
-<file path=customXml/item2.xml><?xml version="1.0" encoding="utf-8"?>
 <p:properties xmlns:p="http://schemas.microsoft.com/office/2006/metadata/properties" xmlns:xsi="http://www.w3.org/2001/XMLSchema-instance" xmlns:pc="http://schemas.microsoft.com/office/infopath/2007/PartnerControls">
   <documentManagement>
     <_dlc_DocId xmlns="0ed01daf-a39b-4322-b336-464aa5091e31">FA43R63HSNSU-804741541-284</_dlc_DocId>
@@ -15624,57 +15609,16 @@
 </p:properties>
 </file>
 
-<file path=customXml/item3.xml><?xml version="1.0" encoding="utf-8"?>
+<file path=customXml/item2.xml><?xml version="1.0" encoding="utf-8"?>
 <?mso-contentType ?>
-<spe:Receivers xmlns:spe="http://schemas.microsoft.com/sharepoint/events">
-  <Receiver>
-    <Name>Document ID Generator</Name>
-    <Synchronization>Synchronous</Synchronization>
-    <Type>10001</Type>
-    <SequenceNumber>1000</SequenceNumber>
-    <Url/>
-    <Assembly>Microsoft.Office.DocumentManagement, Version=16.0.0.0, Culture=neutral, PublicKeyToken=71e9bce111e9429c</Assembly>
-    <Class>Microsoft.Office.DocumentManagement.Internal.DocIdHandler</Class>
-    <Data/>
-    <Filter/>
-  </Receiver>
-  <Receiver>
-    <Name>Document ID Generator</Name>
-    <Synchronization>Synchronous</Synchronization>
-    <Type>10002</Type>
-    <SequenceNumber>1001</SequenceNumber>
-    <Url/>
-    <Assembly>Microsoft.Office.DocumentManagement, Version=16.0.0.0, Culture=neutral, PublicKeyToken=71e9bce111e9429c</Assembly>
-    <Class>Microsoft.Office.DocumentManagement.Internal.DocIdHandler</Class>
-    <Data/>
-    <Filter/>
-  </Receiver>
-  <Receiver>
-    <Name>Document ID Generator</Name>
-    <Synchronization>Synchronous</Synchronization>
-    <Type>10004</Type>
-    <SequenceNumber>1002</SequenceNumber>
-    <Url/>
-    <Assembly>Microsoft.Office.DocumentManagement, Version=16.0.0.0, Culture=neutral, PublicKeyToken=71e9bce111e9429c</Assembly>
-    <Class>Microsoft.Office.DocumentManagement.Internal.DocIdHandler</Class>
-    <Data/>
-    <Filter/>
-  </Receiver>
-  <Receiver>
-    <Name>Document ID Generator</Name>
-    <Synchronization>Synchronous</Synchronization>
-    <Type>10006</Type>
-    <SequenceNumber>1003</SequenceNumber>
-    <Url/>
-    <Assembly>Microsoft.Office.DocumentManagement, Version=16.0.0.0, Culture=neutral, PublicKeyToken=71e9bce111e9429c</Assembly>
-    <Class>Microsoft.Office.DocumentManagement.Internal.DocIdHandler</Class>
-    <Data/>
-    <Filter/>
-  </Receiver>
-</spe:Receivers>
+<FormTemplates xmlns="http://schemas.microsoft.com/sharepoint/v3/contenttype/forms">
+  <Display>DocumentLibraryForm</Display>
+  <Edit>DocumentLibraryForm</Edit>
+  <New>DocumentLibraryForm</New>
+</FormTemplates>
 </file>
 
-<file path=customXml/item4.xml><?xml version="1.0" encoding="utf-8"?>
+<file path=customXml/item3.xml><?xml version="1.0" encoding="utf-8"?>
 <ct:contentTypeSchema xmlns:ct="http://schemas.microsoft.com/office/2006/metadata/contentType" xmlns:ma="http://schemas.microsoft.com/office/2006/metadata/properties/metaAttributes" ct:_="" ma:_="" ma:contentTypeName="Document" ma:contentTypeID="0x010100BB0B2F232D3C164BB1DBF11D49AFF6AC" ma:contentTypeVersion="4" ma:contentTypeDescription="Create a new document." ma:contentTypeScope="" ma:versionID="ace64b76c7fa238c7b43066bfd7f461b">
   <xsd:schema xmlns:xsd="http://www.w3.org/2001/XMLSchema" xmlns:xs="http://www.w3.org/2001/XMLSchema" xmlns:p="http://schemas.microsoft.com/office/2006/metadata/properties" xmlns:ns2="0ed01daf-a39b-4322-b336-464aa5091e31" xmlns:ns3="0a39b131-a25b-485f-89b0-b09e965fe171" targetNamespace="http://schemas.microsoft.com/office/2006/metadata/properties" ma:root="true" ma:fieldsID="2e8e5b7044fbd0fcc71de6236af0cdf4" ns2:_="" ns3:_="">
     <xsd:import namespace="0ed01daf-a39b-4322-b336-464aa5091e31"/>
@@ -15848,15 +15792,57 @@
 </ct:contentTypeSchema>
 </file>
 
-<file path=customXml/itemProps1.xml><?xml version="1.0" encoding="utf-8"?>
-<ds:datastoreItem xmlns:ds="http://schemas.openxmlformats.org/officeDocument/2006/customXml" ds:itemID="{791386F8-E168-492C-B4C3-9A800EDC5964}">
-  <ds:schemaRefs>
-    <ds:schemaRef ds:uri="http://schemas.microsoft.com/sharepoint/v3/contenttype/forms"/>
-  </ds:schemaRefs>
-</ds:datastoreItem>
+<file path=customXml/item4.xml><?xml version="1.0" encoding="utf-8"?>
+<?mso-contentType ?>
+<spe:Receivers xmlns:spe="http://schemas.microsoft.com/sharepoint/events">
+  <Receiver>
+    <Name>Document ID Generator</Name>
+    <Synchronization>Synchronous</Synchronization>
+    <Type>10001</Type>
+    <SequenceNumber>1000</SequenceNumber>
+    <Url/>
+    <Assembly>Microsoft.Office.DocumentManagement, Version=16.0.0.0, Culture=neutral, PublicKeyToken=71e9bce111e9429c</Assembly>
+    <Class>Microsoft.Office.DocumentManagement.Internal.DocIdHandler</Class>
+    <Data/>
+    <Filter/>
+  </Receiver>
+  <Receiver>
+    <Name>Document ID Generator</Name>
+    <Synchronization>Synchronous</Synchronization>
+    <Type>10002</Type>
+    <SequenceNumber>1001</SequenceNumber>
+    <Url/>
+    <Assembly>Microsoft.Office.DocumentManagement, Version=16.0.0.0, Culture=neutral, PublicKeyToken=71e9bce111e9429c</Assembly>
+    <Class>Microsoft.Office.DocumentManagement.Internal.DocIdHandler</Class>
+    <Data/>
+    <Filter/>
+  </Receiver>
+  <Receiver>
+    <Name>Document ID Generator</Name>
+    <Synchronization>Synchronous</Synchronization>
+    <Type>10004</Type>
+    <SequenceNumber>1002</SequenceNumber>
+    <Url/>
+    <Assembly>Microsoft.Office.DocumentManagement, Version=16.0.0.0, Culture=neutral, PublicKeyToken=71e9bce111e9429c</Assembly>
+    <Class>Microsoft.Office.DocumentManagement.Internal.DocIdHandler</Class>
+    <Data/>
+    <Filter/>
+  </Receiver>
+  <Receiver>
+    <Name>Document ID Generator</Name>
+    <Synchronization>Synchronous</Synchronization>
+    <Type>10006</Type>
+    <SequenceNumber>1003</SequenceNumber>
+    <Url/>
+    <Assembly>Microsoft.Office.DocumentManagement, Version=16.0.0.0, Culture=neutral, PublicKeyToken=71e9bce111e9429c</Assembly>
+    <Class>Microsoft.Office.DocumentManagement.Internal.DocIdHandler</Class>
+    <Data/>
+    <Filter/>
+  </Receiver>
+</spe:Receivers>
 </file>
 
-<file path=customXml/itemProps2.xml><?xml version="1.0" encoding="utf-8"?>
+<file path=customXml/itemProps1.xml><?xml version="1.0" encoding="utf-8"?>
 <ds:datastoreItem xmlns:ds="http://schemas.openxmlformats.org/officeDocument/2006/customXml" ds:itemID="{8CE2CDB4-3352-4150-919A-B30B39FD5827}">
   <ds:schemaRefs>
     <ds:schemaRef ds:uri="9d07426f-fcca-4a73-934d-5bf429f9e4a3"/>
@@ -15876,15 +15862,15 @@
 </ds:datastoreItem>
 </file>
 
-<file path=customXml/itemProps3.xml><?xml version="1.0" encoding="utf-8"?>
-<ds:datastoreItem xmlns:ds="http://schemas.openxmlformats.org/officeDocument/2006/customXml" ds:itemID="{EDCF9B43-9EA7-493E-9556-9DC14AABE730}">
+<file path=customXml/itemProps2.xml><?xml version="1.0" encoding="utf-8"?>
+<ds:datastoreItem xmlns:ds="http://schemas.openxmlformats.org/officeDocument/2006/customXml" ds:itemID="{791386F8-E168-492C-B4C3-9A800EDC5964}">
   <ds:schemaRefs>
-    <ds:schemaRef ds:uri="http://schemas.microsoft.com/sharepoint/events"/>
+    <ds:schemaRef ds:uri="http://schemas.microsoft.com/sharepoint/v3/contenttype/forms"/>
   </ds:schemaRefs>
 </ds:datastoreItem>
 </file>
 
-<file path=customXml/itemProps4.xml><?xml version="1.0" encoding="utf-8"?>
+<file path=customXml/itemProps3.xml><?xml version="1.0" encoding="utf-8"?>
 <ds:datastoreItem xmlns:ds="http://schemas.openxmlformats.org/officeDocument/2006/customXml" ds:itemID="{76093642-C416-49BE-8398-0DEB4CFE8FE9}">
   <ds:schemaRefs>
     <ds:schemaRef ds:uri="http://schemas.microsoft.com/office/2006/metadata/contentType"/>
@@ -15901,4 +15887,12 @@
     <ds:schemaRef ds:uri="http://schemas.microsoft.com/internal/obd"/>
   </ds:schemaRefs>
 </ds:datastoreItem>
+</file>
+
+<file path=customXml/itemProps4.xml><?xml version="1.0" encoding="utf-8"?>
+<ds:datastoreItem xmlns:ds="http://schemas.openxmlformats.org/officeDocument/2006/customXml" ds:itemID="{EDCF9B43-9EA7-493E-9556-9DC14AABE730}">
+  <ds:schemaRefs>
+    <ds:schemaRef ds:uri="http://schemas.microsoft.com/sharepoint/events"/>
+  </ds:schemaRefs>
+</ds:datastoreItem>
 </file>
</xml_diff>

<commit_message>
Fixed some typos in the presentation
</commit_message>
<xml_diff>
--- a/docs/presentations/Intern_Showcase_Wei.pptx
+++ b/docs/presentations/Intern_Showcase_Wei.pptx
@@ -6,18 +6,17 @@
     <p:sldMasterId id="2147483712" r:id="rId6"/>
   </p:sldMasterIdLst>
   <p:notesMasterIdLst>
-    <p:notesMasterId r:id="rId16"/>
+    <p:notesMasterId r:id="rId15"/>
   </p:notesMasterIdLst>
   <p:sldIdLst>
     <p:sldId id="463" r:id="rId7"/>
-    <p:sldId id="472" r:id="rId8"/>
-    <p:sldId id="469" r:id="rId9"/>
-    <p:sldId id="461" r:id="rId10"/>
-    <p:sldId id="464" r:id="rId11"/>
-    <p:sldId id="476" r:id="rId12"/>
-    <p:sldId id="473" r:id="rId13"/>
-    <p:sldId id="475" r:id="rId14"/>
-    <p:sldId id="325" r:id="rId15"/>
+    <p:sldId id="469" r:id="rId8"/>
+    <p:sldId id="461" r:id="rId9"/>
+    <p:sldId id="464" r:id="rId10"/>
+    <p:sldId id="476" r:id="rId11"/>
+    <p:sldId id="473" r:id="rId12"/>
+    <p:sldId id="475" r:id="rId13"/>
+    <p:sldId id="325" r:id="rId14"/>
   </p:sldIdLst>
   <p:sldSz cx="9144000" cy="5143500" type="screen16x9"/>
   <p:notesSz cx="6858000" cy="9144000"/>
@@ -226,7 +225,7 @@
           <a:p>
             <a:fld id="{C7319598-7378-4D06-855F-92B3953E18A9}" type="datetimeFigureOut">
               <a:rPr lang="en-US" smtClean="0"/>
-              <a:t>7/17/2024</a:t>
+              <a:t>7/18/2024</a:t>
             </a:fld>
             <a:endParaRPr lang="en-US"/>
           </a:p>
@@ -2804,7 +2803,7 @@
           <a:p>
             <a:fld id="{86A2FD0F-FA34-4173-943C-6FC12C2429A4}" type="datetimeFigureOut">
               <a:rPr lang="en-US" smtClean="0"/>
-              <a:t>7/17/2024</a:t>
+              <a:t>7/18/2024</a:t>
             </a:fld>
             <a:endParaRPr lang="en-US"/>
           </a:p>
@@ -2972,7 +2971,7 @@
           <a:p>
             <a:fld id="{86A2FD0F-FA34-4173-943C-6FC12C2429A4}" type="datetimeFigureOut">
               <a:rPr lang="en-US" smtClean="0"/>
-              <a:t>7/17/2024</a:t>
+              <a:t>7/18/2024</a:t>
             </a:fld>
             <a:endParaRPr lang="en-US"/>
           </a:p>
@@ -3217,7 +3216,7 @@
           <a:p>
             <a:fld id="{86A2FD0F-FA34-4173-943C-6FC12C2429A4}" type="datetimeFigureOut">
               <a:rPr lang="en-US" smtClean="0"/>
-              <a:t>7/17/2024</a:t>
+              <a:t>7/18/2024</a:t>
             </a:fld>
             <a:endParaRPr lang="en-US"/>
           </a:p>
@@ -3446,7 +3445,7 @@
           <a:p>
             <a:fld id="{86A2FD0F-FA34-4173-943C-6FC12C2429A4}" type="datetimeFigureOut">
               <a:rPr lang="en-US" smtClean="0"/>
-              <a:t>7/17/2024</a:t>
+              <a:t>7/18/2024</a:t>
             </a:fld>
             <a:endParaRPr lang="en-US"/>
           </a:p>
@@ -3810,7 +3809,7 @@
           <a:p>
             <a:fld id="{86A2FD0F-FA34-4173-943C-6FC12C2429A4}" type="datetimeFigureOut">
               <a:rPr lang="en-US" smtClean="0"/>
-              <a:t>7/17/2024</a:t>
+              <a:t>7/18/2024</a:t>
             </a:fld>
             <a:endParaRPr lang="en-US"/>
           </a:p>
@@ -4497,7 +4496,7 @@
           <a:p>
             <a:fld id="{86A2FD0F-FA34-4173-943C-6FC12C2429A4}" type="datetimeFigureOut">
               <a:rPr lang="en-US" smtClean="0"/>
-              <a:t>7/17/2024</a:t>
+              <a:t>7/18/2024</a:t>
             </a:fld>
             <a:endParaRPr lang="en-US"/>
           </a:p>
@@ -4592,7 +4591,7 @@
           <a:p>
             <a:fld id="{86A2FD0F-FA34-4173-943C-6FC12C2429A4}" type="datetimeFigureOut">
               <a:rPr lang="en-US" smtClean="0"/>
-              <a:t>7/17/2024</a:t>
+              <a:t>7/18/2024</a:t>
             </a:fld>
             <a:endParaRPr lang="en-US"/>
           </a:p>
@@ -4867,7 +4866,7 @@
           <a:p>
             <a:fld id="{86A2FD0F-FA34-4173-943C-6FC12C2429A4}" type="datetimeFigureOut">
               <a:rPr lang="en-US" smtClean="0"/>
-              <a:t>7/17/2024</a:t>
+              <a:t>7/18/2024</a:t>
             </a:fld>
             <a:endParaRPr lang="en-US"/>
           </a:p>
@@ -5119,7 +5118,7 @@
           <a:p>
             <a:fld id="{86A2FD0F-FA34-4173-943C-6FC12C2429A4}" type="datetimeFigureOut">
               <a:rPr lang="en-US" smtClean="0"/>
-              <a:t>7/17/2024</a:t>
+              <a:t>7/18/2024</a:t>
             </a:fld>
             <a:endParaRPr lang="en-US"/>
           </a:p>
@@ -5287,7 +5286,7 @@
           <a:p>
             <a:fld id="{86A2FD0F-FA34-4173-943C-6FC12C2429A4}" type="datetimeFigureOut">
               <a:rPr lang="en-US" smtClean="0"/>
-              <a:t>7/17/2024</a:t>
+              <a:t>7/18/2024</a:t>
             </a:fld>
             <a:endParaRPr lang="en-US"/>
           </a:p>
@@ -5465,7 +5464,7 @@
           <a:p>
             <a:fld id="{86A2FD0F-FA34-4173-943C-6FC12C2429A4}" type="datetimeFigureOut">
               <a:rPr lang="en-US" smtClean="0"/>
-              <a:t>7/17/2024</a:t>
+              <a:t>7/18/2024</a:t>
             </a:fld>
             <a:endParaRPr lang="en-US"/>
           </a:p>
@@ -5792,7 +5791,7 @@
           <a:p>
             <a:fld id="{FB1E0AA7-3480-410A-94C7-48509DB7D868}" type="datetimeFigureOut">
               <a:rPr lang="en-US" smtClean="0"/>
-              <a:t>7/17/2024</a:t>
+              <a:t>7/18/2024</a:t>
             </a:fld>
             <a:endParaRPr lang="en-US"/>
           </a:p>
@@ -9953,7 +9952,7 @@
           <a:p>
             <a:fld id="{86A2FD0F-FA34-4173-943C-6FC12C2429A4}" type="datetimeFigureOut">
               <a:rPr lang="en-US" smtClean="0"/>
-              <a:t>7/17/2024</a:t>
+              <a:t>7/18/2024</a:t>
             </a:fld>
             <a:endParaRPr lang="en-US"/>
           </a:p>
@@ -10519,145 +10518,6 @@
       </p:grpSpPr>
       <p:sp>
         <p:nvSpPr>
-          <p:cNvPr id="2" name="Footer Placeholder 1"/>
-          <p:cNvSpPr>
-            <a:spLocks noGrp="1"/>
-          </p:cNvSpPr>
-          <p:nvPr>
-            <p:ph type="ftr" sz="quarter" idx="3"/>
-          </p:nvPr>
-        </p:nvSpPr>
-        <p:spPr/>
-        <p:txBody>
-          <a:bodyPr/>
-          <a:lstStyle/>
-          <a:p>
-            <a:r>
-              <a:rPr lang="en-US" kern="0"/>
-              <a:t>Northrop Grumman Proprietary Level I</a:t>
-            </a:r>
-            <a:endParaRPr lang="en-US"/>
-          </a:p>
-        </p:txBody>
-      </p:sp>
-      <p:sp>
-        <p:nvSpPr>
-          <p:cNvPr id="3" name="Slide Number Placeholder 2"/>
-          <p:cNvSpPr>
-            <a:spLocks noGrp="1"/>
-          </p:cNvSpPr>
-          <p:nvPr>
-            <p:ph type="sldNum" sz="quarter" idx="4"/>
-          </p:nvPr>
-        </p:nvSpPr>
-        <p:spPr/>
-        <p:txBody>
-          <a:bodyPr/>
-          <a:lstStyle/>
-          <a:p>
-            <a:fld id="{32A2F39E-E4DB-494E-AB40-38356C65078C}" type="slidenum">
-              <a:rPr lang="en-US" smtClean="0"/>
-              <a:pPr/>
-              <a:t>2</a:t>
-            </a:fld>
-            <a:endParaRPr lang="en-US"/>
-          </a:p>
-        </p:txBody>
-      </p:sp>
-      <p:sp>
-        <p:nvSpPr>
-          <p:cNvPr id="4" name="Title 3"/>
-          <p:cNvSpPr>
-            <a:spLocks noGrp="1"/>
-          </p:cNvSpPr>
-          <p:nvPr>
-            <p:ph type="title"/>
-          </p:nvPr>
-        </p:nvSpPr>
-        <p:spPr/>
-        <p:txBody>
-          <a:bodyPr/>
-          <a:lstStyle/>
-          <a:p>
-            <a:r>
-              <a:rPr lang="en-US"/>
-              <a:t>Agenda</a:t>
-            </a:r>
-          </a:p>
-        </p:txBody>
-      </p:sp>
-      <p:sp>
-        <p:nvSpPr>
-          <p:cNvPr id="5" name="Text Placeholder 4"/>
-          <p:cNvSpPr>
-            <a:spLocks noGrp="1"/>
-          </p:cNvSpPr>
-          <p:nvPr>
-            <p:ph type="body" sz="quarter" idx="11"/>
-          </p:nvPr>
-        </p:nvSpPr>
-        <p:spPr/>
-        <p:txBody>
-          <a:bodyPr/>
-          <a:lstStyle/>
-          <a:p>
-            <a:r>
-              <a:rPr lang="en-US"/>
-              <a:t>Introduction – 2 min</a:t>
-            </a:r>
-          </a:p>
-          <a:p>
-            <a:r>
-              <a:rPr lang="en-US"/>
-              <a:t>Intern Presentation – 6 min per person</a:t>
-            </a:r>
-          </a:p>
-          <a:p>
-            <a:r>
-              <a:rPr lang="en-US"/>
-              <a:t>Q&amp;A – 2 min</a:t>
-            </a:r>
-          </a:p>
-          <a:p>
-            <a:r>
-              <a:rPr lang="en-US"/>
-              <a:t>Leadership Comments – 3 min</a:t>
-            </a:r>
-          </a:p>
-        </p:txBody>
-      </p:sp>
-    </p:spTree>
-    <p:extLst>
-      <p:ext uri="{BB962C8B-B14F-4D97-AF65-F5344CB8AC3E}">
-        <p14:creationId xmlns:p14="http://schemas.microsoft.com/office/powerpoint/2010/main" val="1875389896"/>
-      </p:ext>
-    </p:extLst>
-  </p:cSld>
-  <p:clrMapOvr>
-    <a:masterClrMapping/>
-  </p:clrMapOvr>
-</p:sld>
-</file>
-
-<file path=ppt/slides/slide3.xml><?xml version="1.0" encoding="utf-8"?>
-<p:sld xmlns:a="http://schemas.openxmlformats.org/drawingml/2006/main" xmlns:r="http://schemas.openxmlformats.org/officeDocument/2006/relationships" xmlns:p="http://schemas.openxmlformats.org/presentationml/2006/main">
-  <p:cSld>
-    <p:spTree>
-      <p:nvGrpSpPr>
-        <p:cNvPr id="1" name=""/>
-        <p:cNvGrpSpPr/>
-        <p:nvPr/>
-      </p:nvGrpSpPr>
-      <p:grpSpPr>
-        <a:xfrm>
-          <a:off x="0" y="0"/>
-          <a:ext cx="0" cy="0"/>
-          <a:chOff x="0" y="0"/>
-          <a:chExt cx="0" cy="0"/>
-        </a:xfrm>
-      </p:grpSpPr>
-      <p:sp>
-        <p:nvSpPr>
           <p:cNvPr id="2" name="Title 1"/>
           <p:cNvSpPr>
             <a:spLocks noGrp="1"/>
@@ -10687,7 +10547,7 @@
           <p:nvPr>
             <p:extLst>
               <p:ext uri="{D42A27DB-BD31-4B8C-83A1-F6EECF244321}">
-                <p14:modId xmlns:p14="http://schemas.microsoft.com/office/powerpoint/2010/main" val="3832467205"/>
+                <p14:modId xmlns:p14="http://schemas.microsoft.com/office/powerpoint/2010/main" val="4047640428"/>
               </p:ext>
             </p:extLst>
           </p:nvPr>
@@ -11539,7 +11399,7 @@
                       </a:r>
                       <a:r>
                         <a:rPr lang="en-US" sz="1200" b="0" dirty="0"/>
-                        <a:t>SEARGANT</a:t>
+                        <a:t>SERGANT</a:t>
                       </a:r>
                     </a:p>
                   </a:txBody>
@@ -11635,7 +11495,7 @@
 </p:sld>
 </file>
 
-<file path=ppt/slides/slide4.xml><?xml version="1.0" encoding="utf-8"?>
+<file path=ppt/slides/slide3.xml><?xml version="1.0" encoding="utf-8"?>
 <p:sld xmlns:a="http://schemas.openxmlformats.org/drawingml/2006/main" xmlns:r="http://schemas.openxmlformats.org/officeDocument/2006/relationships" xmlns:p="http://schemas.openxmlformats.org/presentationml/2006/main">
   <p:cSld>
     <p:spTree>
@@ -11693,7 +11553,7 @@
             <a:fld id="{32A2F39E-E4DB-494E-AB40-38356C65078C}" type="slidenum">
               <a:rPr lang="en-US" smtClean="0"/>
               <a:pPr/>
-              <a:t>4</a:t>
+              <a:t>3</a:t>
             </a:fld>
             <a:endParaRPr lang="en-US"/>
           </a:p>
@@ -12252,7 +12112,7 @@
                     <a:schemeClr val="tx2"/>
                   </a:solidFill>
                 </a:rPr>
-                <a:t>SEARGANT Team One Note notebook consisting of ~800 files spread across ~200 folders</a:t>
+                <a:t>SERGANT Team One Note notebook consisting of ~800 files spread across ~200 folders</a:t>
               </a:r>
             </a:p>
           </p:txBody>
@@ -12361,7 +12221,7 @@
 </p:sld>
 </file>
 
-<file path=ppt/slides/slide5.xml><?xml version="1.0" encoding="utf-8"?>
+<file path=ppt/slides/slide4.xml><?xml version="1.0" encoding="utf-8"?>
 <p:sld xmlns:a="http://schemas.openxmlformats.org/drawingml/2006/main" xmlns:r="http://schemas.openxmlformats.org/officeDocument/2006/relationships" xmlns:p="http://schemas.openxmlformats.org/presentationml/2006/main">
   <p:cSld>
     <p:spTree>
@@ -12419,7 +12279,7 @@
             <a:fld id="{32A2F39E-E4DB-494E-AB40-38356C65078C}" type="slidenum">
               <a:rPr lang="en-US" smtClean="0"/>
               <a:pPr/>
-              <a:t>5</a:t>
+              <a:t>4</a:t>
             </a:fld>
             <a:endParaRPr lang="en-US"/>
           </a:p>
@@ -13007,7 +12867,7 @@
 </p:sld>
 </file>
 
-<file path=ppt/slides/slide6.xml><?xml version="1.0" encoding="utf-8"?>
+<file path=ppt/slides/slide5.xml><?xml version="1.0" encoding="utf-8"?>
 <p:sld xmlns:a="http://schemas.openxmlformats.org/drawingml/2006/main" xmlns:r="http://schemas.openxmlformats.org/officeDocument/2006/relationships" xmlns:p="http://schemas.openxmlformats.org/presentationml/2006/main">
   <p:cSld>
     <p:spTree>
@@ -13065,7 +12925,7 @@
             <a:fld id="{32A2F39E-E4DB-494E-AB40-38356C65078C}" type="slidenum">
               <a:rPr lang="en-US" smtClean="0"/>
               <a:pPr/>
-              <a:t>6</a:t>
+              <a:t>5</a:t>
             </a:fld>
             <a:endParaRPr lang="en-US"/>
           </a:p>
@@ -13595,7 +13455,7 @@
 </p:sld>
 </file>
 
-<file path=ppt/slides/slide7.xml><?xml version="1.0" encoding="utf-8"?>
+<file path=ppt/slides/slide6.xml><?xml version="1.0" encoding="utf-8"?>
 <p:sld xmlns:a="http://schemas.openxmlformats.org/drawingml/2006/main" xmlns:r="http://schemas.openxmlformats.org/officeDocument/2006/relationships" xmlns:p="http://schemas.openxmlformats.org/presentationml/2006/main">
   <p:cSld>
     <p:spTree>
@@ -13630,7 +13490,7 @@
             <a:fld id="{32A2F39E-E4DB-494E-AB40-38356C65078C}" type="slidenum">
               <a:rPr lang="en-US" smtClean="0"/>
               <a:pPr/>
-              <a:t>7</a:t>
+              <a:t>6</a:t>
             </a:fld>
             <a:endParaRPr lang="en-US"/>
           </a:p>
@@ -14581,7 +14441,7 @@
 </p:sld>
 </file>
 
-<file path=ppt/slides/slide8.xml><?xml version="1.0" encoding="utf-8"?>
+<file path=ppt/slides/slide7.xml><?xml version="1.0" encoding="utf-8"?>
 <p:sld xmlns:a="http://schemas.openxmlformats.org/drawingml/2006/main" xmlns:r="http://schemas.openxmlformats.org/officeDocument/2006/relationships" xmlns:p="http://schemas.openxmlformats.org/presentationml/2006/main">
   <p:cSld>
     <p:spTree>
@@ -14679,7 +14539,7 @@
             <a:fld id="{32A2F39E-E4DB-494E-AB40-38356C65078C}" type="slidenum">
               <a:rPr lang="en-US" smtClean="0"/>
               <a:pPr/>
-              <a:t>8</a:t>
+              <a:t>7</a:t>
             </a:fld>
             <a:endParaRPr lang="en-US"/>
           </a:p>
@@ -14743,7 +14603,7 @@
 </p:sld>
 </file>
 
-<file path=ppt/slides/slide9.xml><?xml version="1.0" encoding="utf-8"?>
+<file path=ppt/slides/slide8.xml><?xml version="1.0" encoding="utf-8"?>
 <p:sld xmlns:a="http://schemas.openxmlformats.org/drawingml/2006/main" xmlns:r="http://schemas.openxmlformats.org/officeDocument/2006/relationships" xmlns:p="http://schemas.openxmlformats.org/presentationml/2006/main">
   <p:cSld>
     <p:spTree>
@@ -15598,6 +15458,15 @@
 </file>
 
 <file path=customXml/item1.xml><?xml version="1.0" encoding="utf-8"?>
+<?mso-contentType ?>
+<FormTemplates xmlns="http://schemas.microsoft.com/sharepoint/v3/contenttype/forms">
+  <Display>DocumentLibraryForm</Display>
+  <Edit>DocumentLibraryForm</Edit>
+  <New>DocumentLibraryForm</New>
+</FormTemplates>
+</file>
+
+<file path=customXml/item2.xml><?xml version="1.0" encoding="utf-8"?>
 <p:properties xmlns:p="http://schemas.microsoft.com/office/2006/metadata/properties" xmlns:xsi="http://www.w3.org/2001/XMLSchema-instance" xmlns:pc="http://schemas.microsoft.com/office/infopath/2007/PartnerControls">
   <documentManagement>
     <_dlc_DocId xmlns="0ed01daf-a39b-4322-b336-464aa5091e31">FA43R63HSNSU-804741541-284</_dlc_DocId>
@@ -15609,16 +15478,57 @@
 </p:properties>
 </file>
 
-<file path=customXml/item2.xml><?xml version="1.0" encoding="utf-8"?>
+<file path=customXml/item3.xml><?xml version="1.0" encoding="utf-8"?>
 <?mso-contentType ?>
-<FormTemplates xmlns="http://schemas.microsoft.com/sharepoint/v3/contenttype/forms">
-  <Display>DocumentLibraryForm</Display>
-  <Edit>DocumentLibraryForm</Edit>
-  <New>DocumentLibraryForm</New>
-</FormTemplates>
+<spe:Receivers xmlns:spe="http://schemas.microsoft.com/sharepoint/events">
+  <Receiver>
+    <Name>Document ID Generator</Name>
+    <Synchronization>Synchronous</Synchronization>
+    <Type>10001</Type>
+    <SequenceNumber>1000</SequenceNumber>
+    <Url/>
+    <Assembly>Microsoft.Office.DocumentManagement, Version=16.0.0.0, Culture=neutral, PublicKeyToken=71e9bce111e9429c</Assembly>
+    <Class>Microsoft.Office.DocumentManagement.Internal.DocIdHandler</Class>
+    <Data/>
+    <Filter/>
+  </Receiver>
+  <Receiver>
+    <Name>Document ID Generator</Name>
+    <Synchronization>Synchronous</Synchronization>
+    <Type>10002</Type>
+    <SequenceNumber>1001</SequenceNumber>
+    <Url/>
+    <Assembly>Microsoft.Office.DocumentManagement, Version=16.0.0.0, Culture=neutral, PublicKeyToken=71e9bce111e9429c</Assembly>
+    <Class>Microsoft.Office.DocumentManagement.Internal.DocIdHandler</Class>
+    <Data/>
+    <Filter/>
+  </Receiver>
+  <Receiver>
+    <Name>Document ID Generator</Name>
+    <Synchronization>Synchronous</Synchronization>
+    <Type>10004</Type>
+    <SequenceNumber>1002</SequenceNumber>
+    <Url/>
+    <Assembly>Microsoft.Office.DocumentManagement, Version=16.0.0.0, Culture=neutral, PublicKeyToken=71e9bce111e9429c</Assembly>
+    <Class>Microsoft.Office.DocumentManagement.Internal.DocIdHandler</Class>
+    <Data/>
+    <Filter/>
+  </Receiver>
+  <Receiver>
+    <Name>Document ID Generator</Name>
+    <Synchronization>Synchronous</Synchronization>
+    <Type>10006</Type>
+    <SequenceNumber>1003</SequenceNumber>
+    <Url/>
+    <Assembly>Microsoft.Office.DocumentManagement, Version=16.0.0.0, Culture=neutral, PublicKeyToken=71e9bce111e9429c</Assembly>
+    <Class>Microsoft.Office.DocumentManagement.Internal.DocIdHandler</Class>
+    <Data/>
+    <Filter/>
+  </Receiver>
+</spe:Receivers>
 </file>
 
-<file path=customXml/item3.xml><?xml version="1.0" encoding="utf-8"?>
+<file path=customXml/item4.xml><?xml version="1.0" encoding="utf-8"?>
 <ct:contentTypeSchema xmlns:ct="http://schemas.microsoft.com/office/2006/metadata/contentType" xmlns:ma="http://schemas.microsoft.com/office/2006/metadata/properties/metaAttributes" ct:_="" ma:_="" ma:contentTypeName="Document" ma:contentTypeID="0x010100BB0B2F232D3C164BB1DBF11D49AFF6AC" ma:contentTypeVersion="4" ma:contentTypeDescription="Create a new document." ma:contentTypeScope="" ma:versionID="ace64b76c7fa238c7b43066bfd7f461b">
   <xsd:schema xmlns:xsd="http://www.w3.org/2001/XMLSchema" xmlns:xs="http://www.w3.org/2001/XMLSchema" xmlns:p="http://schemas.microsoft.com/office/2006/metadata/properties" xmlns:ns2="0ed01daf-a39b-4322-b336-464aa5091e31" xmlns:ns3="0a39b131-a25b-485f-89b0-b09e965fe171" targetNamespace="http://schemas.microsoft.com/office/2006/metadata/properties" ma:root="true" ma:fieldsID="2e8e5b7044fbd0fcc71de6236af0cdf4" ns2:_="" ns3:_="">
     <xsd:import namespace="0ed01daf-a39b-4322-b336-464aa5091e31"/>
@@ -15792,57 +15702,15 @@
 </ct:contentTypeSchema>
 </file>
 
-<file path=customXml/item4.xml><?xml version="1.0" encoding="utf-8"?>
-<?mso-contentType ?>
-<spe:Receivers xmlns:spe="http://schemas.microsoft.com/sharepoint/events">
-  <Receiver>
-    <Name>Document ID Generator</Name>
-    <Synchronization>Synchronous</Synchronization>
-    <Type>10001</Type>
-    <SequenceNumber>1000</SequenceNumber>
-    <Url/>
-    <Assembly>Microsoft.Office.DocumentManagement, Version=16.0.0.0, Culture=neutral, PublicKeyToken=71e9bce111e9429c</Assembly>
-    <Class>Microsoft.Office.DocumentManagement.Internal.DocIdHandler</Class>
-    <Data/>
-    <Filter/>
-  </Receiver>
-  <Receiver>
-    <Name>Document ID Generator</Name>
-    <Synchronization>Synchronous</Synchronization>
-    <Type>10002</Type>
-    <SequenceNumber>1001</SequenceNumber>
-    <Url/>
-    <Assembly>Microsoft.Office.DocumentManagement, Version=16.0.0.0, Culture=neutral, PublicKeyToken=71e9bce111e9429c</Assembly>
-    <Class>Microsoft.Office.DocumentManagement.Internal.DocIdHandler</Class>
-    <Data/>
-    <Filter/>
-  </Receiver>
-  <Receiver>
-    <Name>Document ID Generator</Name>
-    <Synchronization>Synchronous</Synchronization>
-    <Type>10004</Type>
-    <SequenceNumber>1002</SequenceNumber>
-    <Url/>
-    <Assembly>Microsoft.Office.DocumentManagement, Version=16.0.0.0, Culture=neutral, PublicKeyToken=71e9bce111e9429c</Assembly>
-    <Class>Microsoft.Office.DocumentManagement.Internal.DocIdHandler</Class>
-    <Data/>
-    <Filter/>
-  </Receiver>
-  <Receiver>
-    <Name>Document ID Generator</Name>
-    <Synchronization>Synchronous</Synchronization>
-    <Type>10006</Type>
-    <SequenceNumber>1003</SequenceNumber>
-    <Url/>
-    <Assembly>Microsoft.Office.DocumentManagement, Version=16.0.0.0, Culture=neutral, PublicKeyToken=71e9bce111e9429c</Assembly>
-    <Class>Microsoft.Office.DocumentManagement.Internal.DocIdHandler</Class>
-    <Data/>
-    <Filter/>
-  </Receiver>
-</spe:Receivers>
+<file path=customXml/itemProps1.xml><?xml version="1.0" encoding="utf-8"?>
+<ds:datastoreItem xmlns:ds="http://schemas.openxmlformats.org/officeDocument/2006/customXml" ds:itemID="{791386F8-E168-492C-B4C3-9A800EDC5964}">
+  <ds:schemaRefs>
+    <ds:schemaRef ds:uri="http://schemas.microsoft.com/sharepoint/v3/contenttype/forms"/>
+  </ds:schemaRefs>
+</ds:datastoreItem>
 </file>
 
-<file path=customXml/itemProps1.xml><?xml version="1.0" encoding="utf-8"?>
+<file path=customXml/itemProps2.xml><?xml version="1.0" encoding="utf-8"?>
 <ds:datastoreItem xmlns:ds="http://schemas.openxmlformats.org/officeDocument/2006/customXml" ds:itemID="{8CE2CDB4-3352-4150-919A-B30B39FD5827}">
   <ds:schemaRefs>
     <ds:schemaRef ds:uri="9d07426f-fcca-4a73-934d-5bf429f9e4a3"/>
@@ -15862,15 +15730,15 @@
 </ds:datastoreItem>
 </file>
 
-<file path=customXml/itemProps2.xml><?xml version="1.0" encoding="utf-8"?>
-<ds:datastoreItem xmlns:ds="http://schemas.openxmlformats.org/officeDocument/2006/customXml" ds:itemID="{791386F8-E168-492C-B4C3-9A800EDC5964}">
+<file path=customXml/itemProps3.xml><?xml version="1.0" encoding="utf-8"?>
+<ds:datastoreItem xmlns:ds="http://schemas.openxmlformats.org/officeDocument/2006/customXml" ds:itemID="{EDCF9B43-9EA7-493E-9556-9DC14AABE730}">
   <ds:schemaRefs>
-    <ds:schemaRef ds:uri="http://schemas.microsoft.com/sharepoint/v3/contenttype/forms"/>
+    <ds:schemaRef ds:uri="http://schemas.microsoft.com/sharepoint/events"/>
   </ds:schemaRefs>
 </ds:datastoreItem>
 </file>
 
-<file path=customXml/itemProps3.xml><?xml version="1.0" encoding="utf-8"?>
+<file path=customXml/itemProps4.xml><?xml version="1.0" encoding="utf-8"?>
 <ds:datastoreItem xmlns:ds="http://schemas.openxmlformats.org/officeDocument/2006/customXml" ds:itemID="{76093642-C416-49BE-8398-0DEB4CFE8FE9}">
   <ds:schemaRefs>
     <ds:schemaRef ds:uri="http://schemas.microsoft.com/office/2006/metadata/contentType"/>
@@ -15887,12 +15755,4 @@
     <ds:schemaRef ds:uri="http://schemas.microsoft.com/internal/obd"/>
   </ds:schemaRefs>
 </ds:datastoreItem>
-</file>
-
-<file path=customXml/itemProps4.xml><?xml version="1.0" encoding="utf-8"?>
-<ds:datastoreItem xmlns:ds="http://schemas.openxmlformats.org/officeDocument/2006/customXml" ds:itemID="{EDCF9B43-9EA7-493E-9556-9DC14AABE730}">
-  <ds:schemaRefs>
-    <ds:schemaRef ds:uri="http://schemas.microsoft.com/sharepoint/events"/>
-  </ds:schemaRefs>
-</ds:datastoreItem>
 </file>
</xml_diff>

<commit_message>
Improved slides with top level overview.
</commit_message>
<xml_diff>
--- a/docs/presentations/Intern_Showcase_Wei.pptx
+++ b/docs/presentations/Intern_Showcase_Wei.pptx
@@ -13007,158 +13007,53 @@
           </a:p>
         </p:txBody>
       </p:sp>
-      <p:grpSp>
-        <p:nvGrpSpPr>
-          <p:cNvPr id="14" name="Group 13">
+      <p:pic>
+        <p:nvPicPr>
+          <p:cNvPr id="1025" name="Picture 1" descr="Writing I Love - Philosophy from Calvin (and Hobbes!) - Tom McCallum">
             <a:extLst>
               <a:ext uri="{FF2B5EF4-FFF2-40B4-BE49-F238E27FC236}">
-                <a16:creationId xmlns:a16="http://schemas.microsoft.com/office/drawing/2014/main" id="{7506AE2D-97A3-6907-823F-E321A84AA62E}"/>
+                <a16:creationId xmlns:a16="http://schemas.microsoft.com/office/drawing/2014/main" id="{C2D6D8E1-D1BE-AD81-36F7-D9EBF02125AF}"/>
               </a:ext>
             </a:extLst>
           </p:cNvPr>
-          <p:cNvGrpSpPr/>
+          <p:cNvPicPr>
+            <a:picLocks noChangeAspect="1" noChangeArrowheads="1"/>
+          </p:cNvPicPr>
           <p:nvPr/>
-        </p:nvGrpSpPr>
-        <p:grpSpPr>
+        </p:nvPicPr>
+        <p:blipFill>
+          <a:blip r:embed="rId3">
+            <a:extLst>
+              <a:ext uri="{28A0092B-C50C-407E-A947-70E740481C1C}">
+                <a14:useLocalDpi xmlns:a14="http://schemas.microsoft.com/office/drawing/2010/main" val="0"/>
+              </a:ext>
+            </a:extLst>
+          </a:blip>
+          <a:srcRect/>
+          <a:stretch>
+            <a:fillRect/>
+          </a:stretch>
+        </p:blipFill>
+        <p:spPr bwMode="auto">
           <a:xfrm>
             <a:off x="520846" y="2664477"/>
             <a:ext cx="6086475" cy="2009775"/>
-            <a:chOff x="1320189" y="2282972"/>
-            <a:chExt cx="6086475" cy="2009775"/>
-          </a:xfrm>
-        </p:grpSpPr>
-        <p:pic>
-          <p:nvPicPr>
-            <p:cNvPr id="1025" name="Picture 1" descr="Writing I Love - Philosophy from Calvin (and Hobbes!) - Tom McCallum">
-              <a:extLst>
-                <a:ext uri="{FF2B5EF4-FFF2-40B4-BE49-F238E27FC236}">
-                  <a16:creationId xmlns:a16="http://schemas.microsoft.com/office/drawing/2014/main" id="{C2D6D8E1-D1BE-AD81-36F7-D9EBF02125AF}"/>
-                </a:ext>
-              </a:extLst>
-            </p:cNvPr>
-            <p:cNvPicPr>
-              <a:picLocks noChangeAspect="1" noChangeArrowheads="1"/>
-            </p:cNvPicPr>
-            <p:nvPr/>
-          </p:nvPicPr>
-          <p:blipFill>
-            <a:blip r:embed="rId3">
-              <a:extLst>
-                <a:ext uri="{28A0092B-C50C-407E-A947-70E740481C1C}">
-                  <a14:useLocalDpi xmlns:a14="http://schemas.microsoft.com/office/drawing/2010/main" val="0"/>
-                </a:ext>
-              </a:extLst>
-            </a:blip>
-            <a:srcRect/>
-            <a:stretch>
-              <a:fillRect/>
-            </a:stretch>
-          </p:blipFill>
-          <p:spPr bwMode="auto">
-            <a:xfrm>
-              <a:off x="1320189" y="2282972"/>
-              <a:ext cx="6086475" cy="2009775"/>
-            </a:xfrm>
-            <a:prstGeom prst="rect">
-              <a:avLst/>
-            </a:prstGeom>
-            <a:noFill/>
-            <a:extLst>
-              <a:ext uri="{909E8E84-426E-40DD-AFC4-6F175D3DCCD1}">
-                <a14:hiddenFill xmlns:a14="http://schemas.microsoft.com/office/drawing/2010/main">
-                  <a:solidFill>
-                    <a:srgbClr val="FFFFFF"/>
-                  </a:solidFill>
-                </a14:hiddenFill>
-              </a:ext>
-            </a:extLst>
-          </p:spPr>
-        </p:pic>
-        <p:sp>
-          <p:nvSpPr>
-            <p:cNvPr id="12" name="TextBox 11">
-              <a:extLst>
-                <a:ext uri="{FF2B5EF4-FFF2-40B4-BE49-F238E27FC236}">
-                  <a16:creationId xmlns:a16="http://schemas.microsoft.com/office/drawing/2014/main" id="{E30C97E3-7832-8021-4722-E0D5E4D53CE0}"/>
-                </a:ext>
-              </a:extLst>
-            </p:cNvPr>
-            <p:cNvSpPr txBox="1"/>
-            <p:nvPr/>
-          </p:nvSpPr>
-          <p:spPr>
-            <a:xfrm>
-              <a:off x="5274455" y="3963456"/>
-              <a:ext cx="466282" cy="169277"/>
-            </a:xfrm>
-            <a:prstGeom prst="rect">
-              <a:avLst/>
-            </a:prstGeom>
-            <a:solidFill>
-              <a:schemeClr val="bg1"/>
-            </a:solidFill>
-            <a:ln w="19050">
-              <a:solidFill>
-                <a:srgbClr val="00B050"/>
-              </a:solidFill>
-            </a:ln>
-          </p:spPr>
-          <p:txBody>
-            <a:bodyPr wrap="square" rtlCol="0">
-              <a:spAutoFit/>
-            </a:bodyPr>
-            <a:lstStyle/>
-            <a:p>
-              <a:r>
-                <a:rPr lang="en-US" sz="500" dirty="0"/>
-                <a:t>One Note</a:t>
-              </a:r>
-            </a:p>
-          </p:txBody>
-        </p:sp>
-        <p:sp>
-          <p:nvSpPr>
-            <p:cNvPr id="13" name="TextBox 12">
-              <a:extLst>
-                <a:ext uri="{FF2B5EF4-FFF2-40B4-BE49-F238E27FC236}">
-                  <a16:creationId xmlns:a16="http://schemas.microsoft.com/office/drawing/2014/main" id="{9DE45D0B-D930-F09E-0B4A-EB76844240CA}"/>
-                </a:ext>
-              </a:extLst>
-            </p:cNvPr>
-            <p:cNvSpPr txBox="1"/>
-            <p:nvPr/>
-          </p:nvSpPr>
-          <p:spPr>
-            <a:xfrm>
-              <a:off x="6583479" y="3751228"/>
-              <a:ext cx="489496" cy="169277"/>
-            </a:xfrm>
-            <a:prstGeom prst="rect">
-              <a:avLst/>
-            </a:prstGeom>
-            <a:solidFill>
-              <a:schemeClr val="bg1"/>
-            </a:solidFill>
-            <a:ln w="19050">
-              <a:solidFill>
-                <a:srgbClr val="00B050"/>
-              </a:solidFill>
-            </a:ln>
-          </p:spPr>
-          <p:txBody>
-            <a:bodyPr wrap="square" rtlCol="0">
-              <a:spAutoFit/>
-            </a:bodyPr>
-            <a:lstStyle/>
-            <a:p>
-              <a:r>
-                <a:rPr lang="en-US" sz="500" dirty="0"/>
-                <a:t>One Note</a:t>
-              </a:r>
-            </a:p>
-          </p:txBody>
-        </p:sp>
-      </p:grpSp>
+          </a:xfrm>
+          <a:prstGeom prst="rect">
+            <a:avLst/>
+          </a:prstGeom>
+          <a:noFill/>
+          <a:extLst>
+            <a:ext uri="{909E8E84-426E-40DD-AFC4-6F175D3DCCD1}">
+              <a14:hiddenFill xmlns:a14="http://schemas.microsoft.com/office/drawing/2010/main">
+                <a:solidFill>
+                  <a:srgbClr val="FFFFFF"/>
+                </a:solidFill>
+              </a14:hiddenFill>
+            </a:ext>
+          </a:extLst>
+        </p:spPr>
+      </p:pic>
       <p:grpSp>
         <p:nvGrpSpPr>
           <p:cNvPr id="18" name="Group 17">
@@ -13539,6 +13434,100 @@
           </a:p>
         </p:txBody>
       </p:sp>
+      <p:pic>
+        <p:nvPicPr>
+          <p:cNvPr id="1026" name="Picture 2">
+            <a:extLst>
+              <a:ext uri="{FF2B5EF4-FFF2-40B4-BE49-F238E27FC236}">
+                <a16:creationId xmlns:a16="http://schemas.microsoft.com/office/drawing/2014/main" id="{D2F627D1-8AA5-6111-92ED-C6944440F1B9}"/>
+              </a:ext>
+            </a:extLst>
+          </p:cNvPr>
+          <p:cNvPicPr>
+            <a:picLocks noChangeAspect="1" noChangeArrowheads="1"/>
+          </p:cNvPicPr>
+          <p:nvPr/>
+        </p:nvPicPr>
+        <p:blipFill>
+          <a:blip r:embed="rId6">
+            <a:extLst>
+              <a:ext uri="{28A0092B-C50C-407E-A947-70E740481C1C}">
+                <a14:useLocalDpi xmlns:a14="http://schemas.microsoft.com/office/drawing/2010/main" val="0"/>
+              </a:ext>
+            </a:extLst>
+          </a:blip>
+          <a:srcRect/>
+          <a:stretch>
+            <a:fillRect/>
+          </a:stretch>
+        </p:blipFill>
+        <p:spPr bwMode="auto">
+          <a:xfrm>
+            <a:off x="4390811" y="4135676"/>
+            <a:ext cx="545306" cy="545306"/>
+          </a:xfrm>
+          <a:prstGeom prst="rect">
+            <a:avLst/>
+          </a:prstGeom>
+          <a:noFill/>
+          <a:extLst>
+            <a:ext uri="{909E8E84-426E-40DD-AFC4-6F175D3DCCD1}">
+              <a14:hiddenFill xmlns:a14="http://schemas.microsoft.com/office/drawing/2010/main">
+                <a:solidFill>
+                  <a:srgbClr val="FFFFFF"/>
+                </a:solidFill>
+              </a14:hiddenFill>
+            </a:ext>
+          </a:extLst>
+        </p:spPr>
+      </p:pic>
+      <p:pic>
+        <p:nvPicPr>
+          <p:cNvPr id="5" name="Picture 2">
+            <a:extLst>
+              <a:ext uri="{FF2B5EF4-FFF2-40B4-BE49-F238E27FC236}">
+                <a16:creationId xmlns:a16="http://schemas.microsoft.com/office/drawing/2014/main" id="{19B1167C-87A3-5163-A80C-291BCF455B0A}"/>
+              </a:ext>
+            </a:extLst>
+          </p:cNvPr>
+          <p:cNvPicPr>
+            <a:picLocks noChangeAspect="1" noChangeArrowheads="1"/>
+          </p:cNvPicPr>
+          <p:nvPr/>
+        </p:nvPicPr>
+        <p:blipFill>
+          <a:blip r:embed="rId6">
+            <a:extLst>
+              <a:ext uri="{28A0092B-C50C-407E-A947-70E740481C1C}">
+                <a14:useLocalDpi xmlns:a14="http://schemas.microsoft.com/office/drawing/2010/main" val="0"/>
+              </a:ext>
+            </a:extLst>
+          </a:blip>
+          <a:srcRect/>
+          <a:stretch>
+            <a:fillRect/>
+          </a:stretch>
+        </p:blipFill>
+        <p:spPr bwMode="auto">
+          <a:xfrm>
+            <a:off x="5772150" y="3988570"/>
+            <a:ext cx="545306" cy="545306"/>
+          </a:xfrm>
+          <a:prstGeom prst="rect">
+            <a:avLst/>
+          </a:prstGeom>
+          <a:noFill/>
+          <a:extLst>
+            <a:ext uri="{909E8E84-426E-40DD-AFC4-6F175D3DCCD1}">
+              <a14:hiddenFill xmlns:a14="http://schemas.microsoft.com/office/drawing/2010/main">
+                <a:solidFill>
+                  <a:srgbClr val="FFFFFF"/>
+                </a:solidFill>
+              </a14:hiddenFill>
+            </a:ext>
+          </a:extLst>
+        </p:spPr>
+      </p:pic>
     </p:spTree>
     <p:extLst>
       <p:ext uri="{BB962C8B-B14F-4D97-AF65-F5344CB8AC3E}">
@@ -19186,6 +19175,15 @@
 </file>
 
 <file path=customXml/item1.xml><?xml version="1.0" encoding="utf-8"?>
+<?mso-contentType ?>
+<FormTemplates xmlns="http://schemas.microsoft.com/sharepoint/v3/contenttype/forms">
+  <Display>DocumentLibraryForm</Display>
+  <Edit>DocumentLibraryForm</Edit>
+  <New>DocumentLibraryForm</New>
+</FormTemplates>
+</file>
+
+<file path=customXml/item2.xml><?xml version="1.0" encoding="utf-8"?>
 <p:properties xmlns:p="http://schemas.microsoft.com/office/2006/metadata/properties" xmlns:xsi="http://www.w3.org/2001/XMLSchema-instance" xmlns:pc="http://schemas.microsoft.com/office/infopath/2007/PartnerControls">
   <documentManagement>
     <_dlc_DocId xmlns="0ed01daf-a39b-4322-b336-464aa5091e31">FA43R63HSNSU-804741541-284</_dlc_DocId>
@@ -19197,16 +19195,57 @@
 </p:properties>
 </file>
 
-<file path=customXml/item2.xml><?xml version="1.0" encoding="utf-8"?>
+<file path=customXml/item3.xml><?xml version="1.0" encoding="utf-8"?>
 <?mso-contentType ?>
-<FormTemplates xmlns="http://schemas.microsoft.com/sharepoint/v3/contenttype/forms">
-  <Display>DocumentLibraryForm</Display>
-  <Edit>DocumentLibraryForm</Edit>
-  <New>DocumentLibraryForm</New>
-</FormTemplates>
+<spe:Receivers xmlns:spe="http://schemas.microsoft.com/sharepoint/events">
+  <Receiver>
+    <Name>Document ID Generator</Name>
+    <Synchronization>Synchronous</Synchronization>
+    <Type>10001</Type>
+    <SequenceNumber>1000</SequenceNumber>
+    <Url/>
+    <Assembly>Microsoft.Office.DocumentManagement, Version=16.0.0.0, Culture=neutral, PublicKeyToken=71e9bce111e9429c</Assembly>
+    <Class>Microsoft.Office.DocumentManagement.Internal.DocIdHandler</Class>
+    <Data/>
+    <Filter/>
+  </Receiver>
+  <Receiver>
+    <Name>Document ID Generator</Name>
+    <Synchronization>Synchronous</Synchronization>
+    <Type>10002</Type>
+    <SequenceNumber>1001</SequenceNumber>
+    <Url/>
+    <Assembly>Microsoft.Office.DocumentManagement, Version=16.0.0.0, Culture=neutral, PublicKeyToken=71e9bce111e9429c</Assembly>
+    <Class>Microsoft.Office.DocumentManagement.Internal.DocIdHandler</Class>
+    <Data/>
+    <Filter/>
+  </Receiver>
+  <Receiver>
+    <Name>Document ID Generator</Name>
+    <Synchronization>Synchronous</Synchronization>
+    <Type>10004</Type>
+    <SequenceNumber>1002</SequenceNumber>
+    <Url/>
+    <Assembly>Microsoft.Office.DocumentManagement, Version=16.0.0.0, Culture=neutral, PublicKeyToken=71e9bce111e9429c</Assembly>
+    <Class>Microsoft.Office.DocumentManagement.Internal.DocIdHandler</Class>
+    <Data/>
+    <Filter/>
+  </Receiver>
+  <Receiver>
+    <Name>Document ID Generator</Name>
+    <Synchronization>Synchronous</Synchronization>
+    <Type>10006</Type>
+    <SequenceNumber>1003</SequenceNumber>
+    <Url/>
+    <Assembly>Microsoft.Office.DocumentManagement, Version=16.0.0.0, Culture=neutral, PublicKeyToken=71e9bce111e9429c</Assembly>
+    <Class>Microsoft.Office.DocumentManagement.Internal.DocIdHandler</Class>
+    <Data/>
+    <Filter/>
+  </Receiver>
+</spe:Receivers>
 </file>
 
-<file path=customXml/item3.xml><?xml version="1.0" encoding="utf-8"?>
+<file path=customXml/item4.xml><?xml version="1.0" encoding="utf-8"?>
 <ct:contentTypeSchema xmlns:ct="http://schemas.microsoft.com/office/2006/metadata/contentType" xmlns:ma="http://schemas.microsoft.com/office/2006/metadata/properties/metaAttributes" ct:_="" ma:_="" ma:contentTypeName="Document" ma:contentTypeID="0x010100BB0B2F232D3C164BB1DBF11D49AFF6AC" ma:contentTypeVersion="4" ma:contentTypeDescription="Create a new document." ma:contentTypeScope="" ma:versionID="ace64b76c7fa238c7b43066bfd7f461b">
   <xsd:schema xmlns:xsd="http://www.w3.org/2001/XMLSchema" xmlns:xs="http://www.w3.org/2001/XMLSchema" xmlns:p="http://schemas.microsoft.com/office/2006/metadata/properties" xmlns:ns2="0ed01daf-a39b-4322-b336-464aa5091e31" xmlns:ns3="0a39b131-a25b-485f-89b0-b09e965fe171" targetNamespace="http://schemas.microsoft.com/office/2006/metadata/properties" ma:root="true" ma:fieldsID="2e8e5b7044fbd0fcc71de6236af0cdf4" ns2:_="" ns3:_="">
     <xsd:import namespace="0ed01daf-a39b-4322-b336-464aa5091e31"/>
@@ -19380,57 +19419,15 @@
 </ct:contentTypeSchema>
 </file>
 
-<file path=customXml/item4.xml><?xml version="1.0" encoding="utf-8"?>
-<?mso-contentType ?>
-<spe:Receivers xmlns:spe="http://schemas.microsoft.com/sharepoint/events">
-  <Receiver>
-    <Name>Document ID Generator</Name>
-    <Synchronization>Synchronous</Synchronization>
-    <Type>10001</Type>
-    <SequenceNumber>1000</SequenceNumber>
-    <Url/>
-    <Assembly>Microsoft.Office.DocumentManagement, Version=16.0.0.0, Culture=neutral, PublicKeyToken=71e9bce111e9429c</Assembly>
-    <Class>Microsoft.Office.DocumentManagement.Internal.DocIdHandler</Class>
-    <Data/>
-    <Filter/>
-  </Receiver>
-  <Receiver>
-    <Name>Document ID Generator</Name>
-    <Synchronization>Synchronous</Synchronization>
-    <Type>10002</Type>
-    <SequenceNumber>1001</SequenceNumber>
-    <Url/>
-    <Assembly>Microsoft.Office.DocumentManagement, Version=16.0.0.0, Culture=neutral, PublicKeyToken=71e9bce111e9429c</Assembly>
-    <Class>Microsoft.Office.DocumentManagement.Internal.DocIdHandler</Class>
-    <Data/>
-    <Filter/>
-  </Receiver>
-  <Receiver>
-    <Name>Document ID Generator</Name>
-    <Synchronization>Synchronous</Synchronization>
-    <Type>10004</Type>
-    <SequenceNumber>1002</SequenceNumber>
-    <Url/>
-    <Assembly>Microsoft.Office.DocumentManagement, Version=16.0.0.0, Culture=neutral, PublicKeyToken=71e9bce111e9429c</Assembly>
-    <Class>Microsoft.Office.DocumentManagement.Internal.DocIdHandler</Class>
-    <Data/>
-    <Filter/>
-  </Receiver>
-  <Receiver>
-    <Name>Document ID Generator</Name>
-    <Synchronization>Synchronous</Synchronization>
-    <Type>10006</Type>
-    <SequenceNumber>1003</SequenceNumber>
-    <Url/>
-    <Assembly>Microsoft.Office.DocumentManagement, Version=16.0.0.0, Culture=neutral, PublicKeyToken=71e9bce111e9429c</Assembly>
-    <Class>Microsoft.Office.DocumentManagement.Internal.DocIdHandler</Class>
-    <Data/>
-    <Filter/>
-  </Receiver>
-</spe:Receivers>
+<file path=customXml/itemProps1.xml><?xml version="1.0" encoding="utf-8"?>
+<ds:datastoreItem xmlns:ds="http://schemas.openxmlformats.org/officeDocument/2006/customXml" ds:itemID="{791386F8-E168-492C-B4C3-9A800EDC5964}">
+  <ds:schemaRefs>
+    <ds:schemaRef ds:uri="http://schemas.microsoft.com/sharepoint/v3/contenttype/forms"/>
+  </ds:schemaRefs>
+</ds:datastoreItem>
 </file>
 
-<file path=customXml/itemProps1.xml><?xml version="1.0" encoding="utf-8"?>
+<file path=customXml/itemProps2.xml><?xml version="1.0" encoding="utf-8"?>
 <ds:datastoreItem xmlns:ds="http://schemas.openxmlformats.org/officeDocument/2006/customXml" ds:itemID="{8CE2CDB4-3352-4150-919A-B30B39FD5827}">
   <ds:schemaRefs>
     <ds:schemaRef ds:uri="9d07426f-fcca-4a73-934d-5bf429f9e4a3"/>
@@ -19450,15 +19447,15 @@
 </ds:datastoreItem>
 </file>
 
-<file path=customXml/itemProps2.xml><?xml version="1.0" encoding="utf-8"?>
-<ds:datastoreItem xmlns:ds="http://schemas.openxmlformats.org/officeDocument/2006/customXml" ds:itemID="{791386F8-E168-492C-B4C3-9A800EDC5964}">
+<file path=customXml/itemProps3.xml><?xml version="1.0" encoding="utf-8"?>
+<ds:datastoreItem xmlns:ds="http://schemas.openxmlformats.org/officeDocument/2006/customXml" ds:itemID="{EDCF9B43-9EA7-493E-9556-9DC14AABE730}">
   <ds:schemaRefs>
-    <ds:schemaRef ds:uri="http://schemas.microsoft.com/sharepoint/v3/contenttype/forms"/>
+    <ds:schemaRef ds:uri="http://schemas.microsoft.com/sharepoint/events"/>
   </ds:schemaRefs>
 </ds:datastoreItem>
 </file>
 
-<file path=customXml/itemProps3.xml><?xml version="1.0" encoding="utf-8"?>
+<file path=customXml/itemProps4.xml><?xml version="1.0" encoding="utf-8"?>
 <ds:datastoreItem xmlns:ds="http://schemas.openxmlformats.org/officeDocument/2006/customXml" ds:itemID="{76093642-C416-49BE-8398-0DEB4CFE8FE9}">
   <ds:schemaRefs>
     <ds:schemaRef ds:uri="http://schemas.microsoft.com/office/2006/metadata/contentType"/>
@@ -19475,12 +19472,4 @@
     <ds:schemaRef ds:uri="http://schemas.microsoft.com/internal/obd"/>
   </ds:schemaRefs>
 </ds:datastoreItem>
-</file>
-
-<file path=customXml/itemProps4.xml><?xml version="1.0" encoding="utf-8"?>
-<ds:datastoreItem xmlns:ds="http://schemas.openxmlformats.org/officeDocument/2006/customXml" ds:itemID="{EDCF9B43-9EA7-493E-9556-9DC14AABE730}">
-  <ds:schemaRefs>
-    <ds:schemaRef ds:uri="http://schemas.microsoft.com/sharepoint/events"/>
-  </ds:schemaRefs>
-</ds:datastoreItem>
 </file>
</xml_diff>